<commit_message>
additions to ch 10 ppt
</commit_message>
<xml_diff>
--- a/bus4750/powerpoints/Chapter+10-1+-+Strategic+Management.pptx
+++ b/bus4750/powerpoints/Chapter+10-1+-+Strategic+Management.pptx
@@ -2594,6 +2594,486 @@
       <dsp:cNvGrpSpPr/>
     </dsp:nvGrpSpPr>
     <dsp:grpSpPr/>
+    <dsp:sp modelId="{38C9F4C5-0D26-4536-8098-C5F88D26BF28}">
+      <dsp:nvSpPr>
+        <dsp:cNvPr id="0" name=""/>
+        <dsp:cNvSpPr/>
+      </dsp:nvSpPr>
+      <dsp:spPr>
+        <a:xfrm>
+          <a:off x="2302655" y="994839"/>
+          <a:ext cx="1666073" cy="648588"/>
+        </a:xfrm>
+        <a:custGeom>
+          <a:avLst/>
+          <a:gdLst/>
+          <a:ahLst/>
+          <a:cxnLst/>
+          <a:rect l="0" t="0" r="0" b="0"/>
+          <a:pathLst>
+            <a:path>
+              <a:moveTo>
+                <a:pt x="0" y="0"/>
+              </a:moveTo>
+              <a:lnTo>
+                <a:pt x="0" y="505899"/>
+              </a:lnTo>
+              <a:lnTo>
+                <a:pt x="1666073" y="505899"/>
+              </a:lnTo>
+              <a:lnTo>
+                <a:pt x="1666073" y="648588"/>
+              </a:lnTo>
+            </a:path>
+          </a:pathLst>
+        </a:custGeom>
+        <a:noFill/>
+        <a:ln w="25400" cap="flat" cmpd="sng" algn="ctr">
+          <a:solidFill>
+            <a:schemeClr val="accent1">
+              <a:shade val="60000"/>
+              <a:hueOff val="0"/>
+              <a:satOff val="0"/>
+              <a:lumOff val="0"/>
+              <a:alphaOff val="0"/>
+            </a:schemeClr>
+          </a:solidFill>
+          <a:prstDash val="solid"/>
+        </a:ln>
+        <a:effectLst/>
+      </dsp:spPr>
+      <dsp:style>
+        <a:lnRef idx="2">
+          <a:scrgbClr r="0" g="0" b="0"/>
+        </a:lnRef>
+        <a:fillRef idx="0">
+          <a:scrgbClr r="0" g="0" b="0"/>
+        </a:fillRef>
+        <a:effectRef idx="0">
+          <a:scrgbClr r="0" g="0" b="0"/>
+        </a:effectRef>
+        <a:fontRef idx="minor"/>
+      </dsp:style>
+    </dsp:sp>
+    <dsp:sp modelId="{9EC1E785-F6BC-4E47-98C2-7D39A941CB0C}">
+      <dsp:nvSpPr>
+        <dsp:cNvPr id="0" name=""/>
+        <dsp:cNvSpPr/>
+      </dsp:nvSpPr>
+      <dsp:spPr>
+        <a:xfrm>
+          <a:off x="2256935" y="994839"/>
+          <a:ext cx="91440" cy="648588"/>
+        </a:xfrm>
+        <a:custGeom>
+          <a:avLst/>
+          <a:gdLst/>
+          <a:ahLst/>
+          <a:cxnLst/>
+          <a:rect l="0" t="0" r="0" b="0"/>
+          <a:pathLst>
+            <a:path>
+              <a:moveTo>
+                <a:pt x="45720" y="0"/>
+              </a:moveTo>
+              <a:lnTo>
+                <a:pt x="45720" y="648588"/>
+              </a:lnTo>
+            </a:path>
+          </a:pathLst>
+        </a:custGeom>
+        <a:noFill/>
+        <a:ln w="25400" cap="flat" cmpd="sng" algn="ctr">
+          <a:solidFill>
+            <a:schemeClr val="accent1">
+              <a:shade val="60000"/>
+              <a:hueOff val="0"/>
+              <a:satOff val="0"/>
+              <a:lumOff val="0"/>
+              <a:alphaOff val="0"/>
+            </a:schemeClr>
+          </a:solidFill>
+          <a:prstDash val="solid"/>
+        </a:ln>
+        <a:effectLst/>
+      </dsp:spPr>
+      <dsp:style>
+        <a:lnRef idx="2">
+          <a:scrgbClr r="0" g="0" b="0"/>
+        </a:lnRef>
+        <a:fillRef idx="0">
+          <a:scrgbClr r="0" g="0" b="0"/>
+        </a:fillRef>
+        <a:effectRef idx="0">
+          <a:scrgbClr r="0" g="0" b="0"/>
+        </a:effectRef>
+        <a:fontRef idx="minor"/>
+      </dsp:style>
+    </dsp:sp>
+    <dsp:sp modelId="{A768DD3E-2D1B-4AC6-BCFF-176D94C95F63}">
+      <dsp:nvSpPr>
+        <dsp:cNvPr id="0" name=""/>
+        <dsp:cNvSpPr/>
+      </dsp:nvSpPr>
+      <dsp:spPr>
+        <a:xfrm>
+          <a:off x="679470" y="994839"/>
+          <a:ext cx="1623185" cy="648588"/>
+        </a:xfrm>
+        <a:custGeom>
+          <a:avLst/>
+          <a:gdLst/>
+          <a:ahLst/>
+          <a:cxnLst/>
+          <a:rect l="0" t="0" r="0" b="0"/>
+          <a:pathLst>
+            <a:path>
+              <a:moveTo>
+                <a:pt x="1623185" y="0"/>
+              </a:moveTo>
+              <a:lnTo>
+                <a:pt x="1623185" y="505899"/>
+              </a:lnTo>
+              <a:lnTo>
+                <a:pt x="0" y="505899"/>
+              </a:lnTo>
+              <a:lnTo>
+                <a:pt x="0" y="648588"/>
+              </a:lnTo>
+            </a:path>
+          </a:pathLst>
+        </a:custGeom>
+        <a:noFill/>
+        <a:ln w="25400" cap="flat" cmpd="sng" algn="ctr">
+          <a:solidFill>
+            <a:schemeClr val="accent1">
+              <a:shade val="60000"/>
+              <a:hueOff val="0"/>
+              <a:satOff val="0"/>
+              <a:lumOff val="0"/>
+              <a:alphaOff val="0"/>
+            </a:schemeClr>
+          </a:solidFill>
+          <a:prstDash val="solid"/>
+        </a:ln>
+        <a:effectLst/>
+      </dsp:spPr>
+      <dsp:style>
+        <a:lnRef idx="2">
+          <a:scrgbClr r="0" g="0" b="0"/>
+        </a:lnRef>
+        <a:fillRef idx="0">
+          <a:scrgbClr r="0" g="0" b="0"/>
+        </a:fillRef>
+        <a:effectRef idx="0">
+          <a:scrgbClr r="0" g="0" b="0"/>
+        </a:effectRef>
+        <a:fontRef idx="minor"/>
+      </dsp:style>
+    </dsp:sp>
+    <dsp:sp modelId="{0550ADA8-CA81-4AA6-A21A-CFC653330F57}">
+      <dsp:nvSpPr>
+        <dsp:cNvPr id="0" name=""/>
+        <dsp:cNvSpPr/>
+      </dsp:nvSpPr>
+      <dsp:spPr>
+        <a:xfrm>
+          <a:off x="1623185" y="315369"/>
+          <a:ext cx="1358940" cy="679470"/>
+        </a:xfrm>
+        <a:prstGeom prst="rect">
+          <a:avLst/>
+        </a:prstGeom>
+        <a:solidFill>
+          <a:schemeClr val="accent1">
+            <a:hueOff val="0"/>
+            <a:satOff val="0"/>
+            <a:lumOff val="0"/>
+            <a:alphaOff val="0"/>
+          </a:schemeClr>
+        </a:solidFill>
+        <a:ln w="25400" cap="flat" cmpd="sng" algn="ctr">
+          <a:solidFill>
+            <a:schemeClr val="lt1">
+              <a:hueOff val="0"/>
+              <a:satOff val="0"/>
+              <a:lumOff val="0"/>
+              <a:alphaOff val="0"/>
+            </a:schemeClr>
+          </a:solidFill>
+          <a:prstDash val="solid"/>
+        </a:ln>
+        <a:effectLst/>
+      </dsp:spPr>
+      <dsp:style>
+        <a:lnRef idx="2">
+          <a:scrgbClr r="0" g="0" b="0"/>
+        </a:lnRef>
+        <a:fillRef idx="1">
+          <a:scrgbClr r="0" g="0" b="0"/>
+        </a:fillRef>
+        <a:effectRef idx="0">
+          <a:scrgbClr r="0" g="0" b="0"/>
+        </a:effectRef>
+        <a:fontRef idx="minor">
+          <a:schemeClr val="lt1"/>
+        </a:fontRef>
+      </dsp:style>
+      <dsp:txBody>
+        <a:bodyPr spcFirstLastPara="0" vert="horz" wrap="square" lIns="12700" tIns="12700" rIns="12700" bIns="12700" numCol="1" spcCol="1270" anchor="ctr" anchorCtr="0">
+          <a:noAutofit/>
+        </a:bodyPr>
+        <a:lstStyle/>
+        <a:p>
+          <a:pPr lvl="0" algn="ctr" defTabSz="889000">
+            <a:lnSpc>
+              <a:spcPct val="90000"/>
+            </a:lnSpc>
+            <a:spcBef>
+              <a:spcPct val="0"/>
+            </a:spcBef>
+            <a:spcAft>
+              <a:spcPct val="35000"/>
+            </a:spcAft>
+          </a:pPr>
+          <a:r>
+            <a:rPr lang="en-US" sz="2000" kern="1200" dirty="0" smtClean="0"/>
+            <a:t>CEO</a:t>
+          </a:r>
+          <a:endParaRPr lang="en-US" sz="2000" kern="1200" dirty="0"/>
+        </a:p>
+      </dsp:txBody>
+      <dsp:txXfrm>
+        <a:off x="1623185" y="315369"/>
+        <a:ext cx="1358940" cy="679470"/>
+      </dsp:txXfrm>
+    </dsp:sp>
+    <dsp:sp modelId="{2987AC8D-FADE-40EC-942D-5BD16ECB07E3}">
+      <dsp:nvSpPr>
+        <dsp:cNvPr id="0" name=""/>
+        <dsp:cNvSpPr/>
+      </dsp:nvSpPr>
+      <dsp:spPr>
+        <a:xfrm>
+          <a:off x="0" y="1643427"/>
+          <a:ext cx="1358940" cy="679470"/>
+        </a:xfrm>
+        <a:prstGeom prst="rect">
+          <a:avLst/>
+        </a:prstGeom>
+        <a:solidFill>
+          <a:schemeClr val="accent1">
+            <a:hueOff val="0"/>
+            <a:satOff val="0"/>
+            <a:lumOff val="0"/>
+            <a:alphaOff val="0"/>
+          </a:schemeClr>
+        </a:solidFill>
+        <a:ln w="25400" cap="flat" cmpd="sng" algn="ctr">
+          <a:solidFill>
+            <a:schemeClr val="lt1">
+              <a:hueOff val="0"/>
+              <a:satOff val="0"/>
+              <a:lumOff val="0"/>
+              <a:alphaOff val="0"/>
+            </a:schemeClr>
+          </a:solidFill>
+          <a:prstDash val="solid"/>
+        </a:ln>
+        <a:effectLst/>
+      </dsp:spPr>
+      <dsp:style>
+        <a:lnRef idx="2">
+          <a:scrgbClr r="0" g="0" b="0"/>
+        </a:lnRef>
+        <a:fillRef idx="1">
+          <a:scrgbClr r="0" g="0" b="0"/>
+        </a:fillRef>
+        <a:effectRef idx="0">
+          <a:scrgbClr r="0" g="0" b="0"/>
+        </a:effectRef>
+        <a:fontRef idx="minor">
+          <a:schemeClr val="lt1"/>
+        </a:fontRef>
+      </dsp:style>
+      <dsp:txBody>
+        <a:bodyPr spcFirstLastPara="0" vert="horz" wrap="square" lIns="11430" tIns="11430" rIns="11430" bIns="11430" numCol="1" spcCol="1270" anchor="ctr" anchorCtr="0">
+          <a:noAutofit/>
+        </a:bodyPr>
+        <a:lstStyle/>
+        <a:p>
+          <a:pPr lvl="0" algn="ctr" defTabSz="800100">
+            <a:lnSpc>
+              <a:spcPct val="90000"/>
+            </a:lnSpc>
+            <a:spcBef>
+              <a:spcPct val="0"/>
+            </a:spcBef>
+            <a:spcAft>
+              <a:spcPct val="35000"/>
+            </a:spcAft>
+          </a:pPr>
+          <a:r>
+            <a:rPr lang="en-US" sz="1800" kern="1200" dirty="0" smtClean="0"/>
+            <a:t>Function 1</a:t>
+          </a:r>
+          <a:endParaRPr lang="en-US" sz="1800" kern="1200" dirty="0"/>
+        </a:p>
+      </dsp:txBody>
+      <dsp:txXfrm>
+        <a:off x="0" y="1643427"/>
+        <a:ext cx="1358940" cy="679470"/>
+      </dsp:txXfrm>
+    </dsp:sp>
+    <dsp:sp modelId="{104B26B2-F0F9-43D7-9025-8E64D41CE732}">
+      <dsp:nvSpPr>
+        <dsp:cNvPr id="0" name=""/>
+        <dsp:cNvSpPr/>
+      </dsp:nvSpPr>
+      <dsp:spPr>
+        <a:xfrm>
+          <a:off x="1623185" y="1643427"/>
+          <a:ext cx="1358940" cy="679470"/>
+        </a:xfrm>
+        <a:prstGeom prst="rect">
+          <a:avLst/>
+        </a:prstGeom>
+        <a:solidFill>
+          <a:schemeClr val="accent1">
+            <a:hueOff val="0"/>
+            <a:satOff val="0"/>
+            <a:lumOff val="0"/>
+            <a:alphaOff val="0"/>
+          </a:schemeClr>
+        </a:solidFill>
+        <a:ln w="25400" cap="flat" cmpd="sng" algn="ctr">
+          <a:solidFill>
+            <a:schemeClr val="lt1">
+              <a:hueOff val="0"/>
+              <a:satOff val="0"/>
+              <a:lumOff val="0"/>
+              <a:alphaOff val="0"/>
+            </a:schemeClr>
+          </a:solidFill>
+          <a:prstDash val="solid"/>
+        </a:ln>
+        <a:effectLst/>
+      </dsp:spPr>
+      <dsp:style>
+        <a:lnRef idx="2">
+          <a:scrgbClr r="0" g="0" b="0"/>
+        </a:lnRef>
+        <a:fillRef idx="1">
+          <a:scrgbClr r="0" g="0" b="0"/>
+        </a:fillRef>
+        <a:effectRef idx="0">
+          <a:scrgbClr r="0" g="0" b="0"/>
+        </a:effectRef>
+        <a:fontRef idx="minor">
+          <a:schemeClr val="lt1"/>
+        </a:fontRef>
+      </dsp:style>
+      <dsp:txBody>
+        <a:bodyPr spcFirstLastPara="0" vert="horz" wrap="square" lIns="11430" tIns="11430" rIns="11430" bIns="11430" numCol="1" spcCol="1270" anchor="ctr" anchorCtr="0">
+          <a:noAutofit/>
+        </a:bodyPr>
+        <a:lstStyle/>
+        <a:p>
+          <a:pPr lvl="0" algn="ctr" defTabSz="800100">
+            <a:lnSpc>
+              <a:spcPct val="90000"/>
+            </a:lnSpc>
+            <a:spcBef>
+              <a:spcPct val="0"/>
+            </a:spcBef>
+            <a:spcAft>
+              <a:spcPct val="35000"/>
+            </a:spcAft>
+          </a:pPr>
+          <a:r>
+            <a:rPr lang="en-US" sz="1800" kern="1200" dirty="0" smtClean="0"/>
+            <a:t>Function 2</a:t>
+          </a:r>
+          <a:endParaRPr lang="en-US" sz="1800" kern="1200" dirty="0"/>
+        </a:p>
+      </dsp:txBody>
+      <dsp:txXfrm>
+        <a:off x="1623185" y="1643427"/>
+        <a:ext cx="1358940" cy="679470"/>
+      </dsp:txXfrm>
+    </dsp:sp>
+    <dsp:sp modelId="{1847DF83-BF70-40BB-8261-7FF8B9D3DBB0}">
+      <dsp:nvSpPr>
+        <dsp:cNvPr id="0" name=""/>
+        <dsp:cNvSpPr/>
+      </dsp:nvSpPr>
+      <dsp:spPr>
+        <a:xfrm>
+          <a:off x="3289259" y="1643427"/>
+          <a:ext cx="1358940" cy="679470"/>
+        </a:xfrm>
+        <a:prstGeom prst="rect">
+          <a:avLst/>
+        </a:prstGeom>
+        <a:solidFill>
+          <a:srgbClr val="00B050"/>
+        </a:solidFill>
+        <a:ln w="25400" cap="flat" cmpd="sng" algn="ctr">
+          <a:solidFill>
+            <a:schemeClr val="lt1">
+              <a:hueOff val="0"/>
+              <a:satOff val="0"/>
+              <a:lumOff val="0"/>
+              <a:alphaOff val="0"/>
+            </a:schemeClr>
+          </a:solidFill>
+          <a:prstDash val="solid"/>
+        </a:ln>
+        <a:effectLst/>
+      </dsp:spPr>
+      <dsp:style>
+        <a:lnRef idx="2">
+          <a:scrgbClr r="0" g="0" b="0"/>
+        </a:lnRef>
+        <a:fillRef idx="1">
+          <a:scrgbClr r="0" g="0" b="0"/>
+        </a:fillRef>
+        <a:effectRef idx="0">
+          <a:scrgbClr r="0" g="0" b="0"/>
+        </a:effectRef>
+        <a:fontRef idx="minor">
+          <a:schemeClr val="lt1"/>
+        </a:fontRef>
+      </dsp:style>
+      <dsp:txBody>
+        <a:bodyPr spcFirstLastPara="0" vert="horz" wrap="square" lIns="11430" tIns="11430" rIns="11430" bIns="11430" numCol="1" spcCol="1270" anchor="ctr" anchorCtr="0">
+          <a:noAutofit/>
+        </a:bodyPr>
+        <a:lstStyle/>
+        <a:p>
+          <a:pPr lvl="0" algn="ctr" defTabSz="800100">
+            <a:lnSpc>
+              <a:spcPct val="90000"/>
+            </a:lnSpc>
+            <a:spcBef>
+              <a:spcPct val="0"/>
+            </a:spcBef>
+            <a:spcAft>
+              <a:spcPct val="35000"/>
+            </a:spcAft>
+          </a:pPr>
+          <a:r>
+            <a:rPr lang="en-US" sz="1800" kern="1200" smtClean="0"/>
+            <a:t>International Division</a:t>
+          </a:r>
+          <a:endParaRPr lang="en-US" sz="1800" kern="1200" dirty="0"/>
+        </a:p>
+      </dsp:txBody>
+      <dsp:txXfrm>
+        <a:off x="3289259" y="1643427"/>
+        <a:ext cx="1358940" cy="679470"/>
+      </dsp:txXfrm>
+    </dsp:sp>
   </dsp:spTree>
 </dsp:drawing>
 </file>
@@ -2606,6 +3086,491 @@
       <dsp:cNvGrpSpPr/>
     </dsp:nvGrpSpPr>
     <dsp:grpSpPr/>
+    <dsp:sp modelId="{863EADCB-A6B2-4C72-AA02-8022EC204D66}">
+      <dsp:nvSpPr>
+        <dsp:cNvPr id="0" name=""/>
+        <dsp:cNvSpPr/>
+      </dsp:nvSpPr>
+      <dsp:spPr>
+        <a:xfrm>
+          <a:off x="2302655" y="994839"/>
+          <a:ext cx="1644317" cy="648588"/>
+        </a:xfrm>
+        <a:custGeom>
+          <a:avLst/>
+          <a:gdLst/>
+          <a:ahLst/>
+          <a:cxnLst/>
+          <a:rect l="0" t="0" r="0" b="0"/>
+          <a:pathLst>
+            <a:path>
+              <a:moveTo>
+                <a:pt x="0" y="0"/>
+              </a:moveTo>
+              <a:lnTo>
+                <a:pt x="0" y="505899"/>
+              </a:lnTo>
+              <a:lnTo>
+                <a:pt x="1644317" y="505899"/>
+              </a:lnTo>
+              <a:lnTo>
+                <a:pt x="1644317" y="648588"/>
+              </a:lnTo>
+            </a:path>
+          </a:pathLst>
+        </a:custGeom>
+        <a:noFill/>
+        <a:ln w="25400" cap="flat" cmpd="sng" algn="ctr">
+          <a:solidFill>
+            <a:schemeClr val="accent1">
+              <a:shade val="60000"/>
+              <a:hueOff val="0"/>
+              <a:satOff val="0"/>
+              <a:lumOff val="0"/>
+              <a:alphaOff val="0"/>
+            </a:schemeClr>
+          </a:solidFill>
+          <a:prstDash val="solid"/>
+        </a:ln>
+        <a:effectLst/>
+      </dsp:spPr>
+      <dsp:style>
+        <a:lnRef idx="2">
+          <a:scrgbClr r="0" g="0" b="0"/>
+        </a:lnRef>
+        <a:fillRef idx="0">
+          <a:scrgbClr r="0" g="0" b="0"/>
+        </a:fillRef>
+        <a:effectRef idx="0">
+          <a:scrgbClr r="0" g="0" b="0"/>
+        </a:effectRef>
+        <a:fontRef idx="minor"/>
+      </dsp:style>
+    </dsp:sp>
+    <dsp:sp modelId="{9EC1E785-F6BC-4E47-98C2-7D39A941CB0C}">
+      <dsp:nvSpPr>
+        <dsp:cNvPr id="0" name=""/>
+        <dsp:cNvSpPr/>
+      </dsp:nvSpPr>
+      <dsp:spPr>
+        <a:xfrm>
+          <a:off x="2256935" y="994839"/>
+          <a:ext cx="91440" cy="648588"/>
+        </a:xfrm>
+        <a:custGeom>
+          <a:avLst/>
+          <a:gdLst/>
+          <a:ahLst/>
+          <a:cxnLst/>
+          <a:rect l="0" t="0" r="0" b="0"/>
+          <a:pathLst>
+            <a:path>
+              <a:moveTo>
+                <a:pt x="45720" y="0"/>
+              </a:moveTo>
+              <a:lnTo>
+                <a:pt x="45720" y="648588"/>
+              </a:lnTo>
+            </a:path>
+          </a:pathLst>
+        </a:custGeom>
+        <a:noFill/>
+        <a:ln w="25400" cap="flat" cmpd="sng" algn="ctr">
+          <a:solidFill>
+            <a:schemeClr val="accent1">
+              <a:shade val="60000"/>
+              <a:hueOff val="0"/>
+              <a:satOff val="0"/>
+              <a:lumOff val="0"/>
+              <a:alphaOff val="0"/>
+            </a:schemeClr>
+          </a:solidFill>
+          <a:prstDash val="solid"/>
+        </a:ln>
+        <a:effectLst/>
+      </dsp:spPr>
+      <dsp:style>
+        <a:lnRef idx="2">
+          <a:scrgbClr r="0" g="0" b="0"/>
+        </a:lnRef>
+        <a:fillRef idx="0">
+          <a:scrgbClr r="0" g="0" b="0"/>
+        </a:fillRef>
+        <a:effectRef idx="0">
+          <a:scrgbClr r="0" g="0" b="0"/>
+        </a:effectRef>
+        <a:fontRef idx="minor"/>
+      </dsp:style>
+    </dsp:sp>
+    <dsp:sp modelId="{A768DD3E-2D1B-4AC6-BCFF-176D94C95F63}">
+      <dsp:nvSpPr>
+        <dsp:cNvPr id="0" name=""/>
+        <dsp:cNvSpPr/>
+      </dsp:nvSpPr>
+      <dsp:spPr>
+        <a:xfrm>
+          <a:off x="679470" y="994839"/>
+          <a:ext cx="1623185" cy="648588"/>
+        </a:xfrm>
+        <a:custGeom>
+          <a:avLst/>
+          <a:gdLst/>
+          <a:ahLst/>
+          <a:cxnLst/>
+          <a:rect l="0" t="0" r="0" b="0"/>
+          <a:pathLst>
+            <a:path>
+              <a:moveTo>
+                <a:pt x="1623185" y="0"/>
+              </a:moveTo>
+              <a:lnTo>
+                <a:pt x="1623185" y="505899"/>
+              </a:lnTo>
+              <a:lnTo>
+                <a:pt x="0" y="505899"/>
+              </a:lnTo>
+              <a:lnTo>
+                <a:pt x="0" y="648588"/>
+              </a:lnTo>
+            </a:path>
+          </a:pathLst>
+        </a:custGeom>
+        <a:noFill/>
+        <a:ln w="25400" cap="flat" cmpd="sng" algn="ctr">
+          <a:solidFill>
+            <a:schemeClr val="accent1">
+              <a:shade val="60000"/>
+              <a:hueOff val="0"/>
+              <a:satOff val="0"/>
+              <a:lumOff val="0"/>
+              <a:alphaOff val="0"/>
+            </a:schemeClr>
+          </a:solidFill>
+          <a:prstDash val="solid"/>
+        </a:ln>
+        <a:effectLst/>
+      </dsp:spPr>
+      <dsp:style>
+        <a:lnRef idx="2">
+          <a:scrgbClr r="0" g="0" b="0"/>
+        </a:lnRef>
+        <a:fillRef idx="0">
+          <a:scrgbClr r="0" g="0" b="0"/>
+        </a:fillRef>
+        <a:effectRef idx="0">
+          <a:scrgbClr r="0" g="0" b="0"/>
+        </a:effectRef>
+        <a:fontRef idx="minor"/>
+      </dsp:style>
+    </dsp:sp>
+    <dsp:sp modelId="{0550ADA8-CA81-4AA6-A21A-CFC653330F57}">
+      <dsp:nvSpPr>
+        <dsp:cNvPr id="0" name=""/>
+        <dsp:cNvSpPr/>
+      </dsp:nvSpPr>
+      <dsp:spPr>
+        <a:xfrm>
+          <a:off x="1623185" y="315369"/>
+          <a:ext cx="1358940" cy="679470"/>
+        </a:xfrm>
+        <a:prstGeom prst="rect">
+          <a:avLst/>
+        </a:prstGeom>
+        <a:solidFill>
+          <a:schemeClr val="accent1">
+            <a:hueOff val="0"/>
+            <a:satOff val="0"/>
+            <a:lumOff val="0"/>
+            <a:alphaOff val="0"/>
+          </a:schemeClr>
+        </a:solidFill>
+        <a:ln w="25400" cap="flat" cmpd="sng" algn="ctr">
+          <a:solidFill>
+            <a:schemeClr val="lt1">
+              <a:hueOff val="0"/>
+              <a:satOff val="0"/>
+              <a:lumOff val="0"/>
+              <a:alphaOff val="0"/>
+            </a:schemeClr>
+          </a:solidFill>
+          <a:prstDash val="solid"/>
+        </a:ln>
+        <a:effectLst/>
+      </dsp:spPr>
+      <dsp:style>
+        <a:lnRef idx="2">
+          <a:scrgbClr r="0" g="0" b="0"/>
+        </a:lnRef>
+        <a:fillRef idx="1">
+          <a:scrgbClr r="0" g="0" b="0"/>
+        </a:fillRef>
+        <a:effectRef idx="0">
+          <a:scrgbClr r="0" g="0" b="0"/>
+        </a:effectRef>
+        <a:fontRef idx="minor">
+          <a:schemeClr val="lt1"/>
+        </a:fontRef>
+      </dsp:style>
+      <dsp:txBody>
+        <a:bodyPr spcFirstLastPara="0" vert="horz" wrap="square" lIns="12700" tIns="12700" rIns="12700" bIns="12700" numCol="1" spcCol="1270" anchor="ctr" anchorCtr="0">
+          <a:noAutofit/>
+        </a:bodyPr>
+        <a:lstStyle/>
+        <a:p>
+          <a:pPr lvl="0" algn="ctr" defTabSz="889000">
+            <a:lnSpc>
+              <a:spcPct val="90000"/>
+            </a:lnSpc>
+            <a:spcBef>
+              <a:spcPct val="0"/>
+            </a:spcBef>
+            <a:spcAft>
+              <a:spcPct val="35000"/>
+            </a:spcAft>
+          </a:pPr>
+          <a:r>
+            <a:rPr lang="en-US" sz="2000" kern="1200" dirty="0" smtClean="0"/>
+            <a:t>CEO</a:t>
+          </a:r>
+          <a:endParaRPr lang="en-US" sz="2000" kern="1200" dirty="0"/>
+        </a:p>
+      </dsp:txBody>
+      <dsp:txXfrm>
+        <a:off x="1623185" y="315369"/>
+        <a:ext cx="1358940" cy="679470"/>
+      </dsp:txXfrm>
+    </dsp:sp>
+    <dsp:sp modelId="{2987AC8D-FADE-40EC-942D-5BD16ECB07E3}">
+      <dsp:nvSpPr>
+        <dsp:cNvPr id="0" name=""/>
+        <dsp:cNvSpPr/>
+      </dsp:nvSpPr>
+      <dsp:spPr>
+        <a:xfrm>
+          <a:off x="0" y="1643427"/>
+          <a:ext cx="1358940" cy="679470"/>
+        </a:xfrm>
+        <a:prstGeom prst="rect">
+          <a:avLst/>
+        </a:prstGeom>
+        <a:solidFill>
+          <a:schemeClr val="accent1">
+            <a:hueOff val="0"/>
+            <a:satOff val="0"/>
+            <a:lumOff val="0"/>
+            <a:alphaOff val="0"/>
+          </a:schemeClr>
+        </a:solidFill>
+        <a:ln w="25400" cap="flat" cmpd="sng" algn="ctr">
+          <a:solidFill>
+            <a:schemeClr val="lt1">
+              <a:hueOff val="0"/>
+              <a:satOff val="0"/>
+              <a:lumOff val="0"/>
+              <a:alphaOff val="0"/>
+            </a:schemeClr>
+          </a:solidFill>
+          <a:prstDash val="solid"/>
+        </a:ln>
+        <a:effectLst/>
+      </dsp:spPr>
+      <dsp:style>
+        <a:lnRef idx="2">
+          <a:scrgbClr r="0" g="0" b="0"/>
+        </a:lnRef>
+        <a:fillRef idx="1">
+          <a:scrgbClr r="0" g="0" b="0"/>
+        </a:fillRef>
+        <a:effectRef idx="0">
+          <a:scrgbClr r="0" g="0" b="0"/>
+        </a:effectRef>
+        <a:fontRef idx="minor">
+          <a:schemeClr val="lt1"/>
+        </a:fontRef>
+      </dsp:style>
+      <dsp:txBody>
+        <a:bodyPr spcFirstLastPara="0" vert="horz" wrap="square" lIns="11430" tIns="11430" rIns="11430" bIns="11430" numCol="1" spcCol="1270" anchor="ctr" anchorCtr="0">
+          <a:noAutofit/>
+        </a:bodyPr>
+        <a:lstStyle/>
+        <a:p>
+          <a:pPr lvl="0" algn="ctr" defTabSz="800100">
+            <a:lnSpc>
+              <a:spcPct val="90000"/>
+            </a:lnSpc>
+            <a:spcBef>
+              <a:spcPct val="0"/>
+            </a:spcBef>
+            <a:spcAft>
+              <a:spcPct val="35000"/>
+            </a:spcAft>
+          </a:pPr>
+          <a:r>
+            <a:rPr lang="en-US" sz="1800" kern="1200" dirty="0" smtClean="0"/>
+            <a:t>Area 1</a:t>
+          </a:r>
+          <a:endParaRPr lang="en-US" sz="1800" kern="1200" dirty="0"/>
+        </a:p>
+      </dsp:txBody>
+      <dsp:txXfrm>
+        <a:off x="0" y="1643427"/>
+        <a:ext cx="1358940" cy="679470"/>
+      </dsp:txXfrm>
+    </dsp:sp>
+    <dsp:sp modelId="{104B26B2-F0F9-43D7-9025-8E64D41CE732}">
+      <dsp:nvSpPr>
+        <dsp:cNvPr id="0" name=""/>
+        <dsp:cNvSpPr/>
+      </dsp:nvSpPr>
+      <dsp:spPr>
+        <a:xfrm>
+          <a:off x="1623185" y="1643427"/>
+          <a:ext cx="1358940" cy="679470"/>
+        </a:xfrm>
+        <a:prstGeom prst="rect">
+          <a:avLst/>
+        </a:prstGeom>
+        <a:solidFill>
+          <a:schemeClr val="accent1">
+            <a:hueOff val="0"/>
+            <a:satOff val="0"/>
+            <a:lumOff val="0"/>
+            <a:alphaOff val="0"/>
+          </a:schemeClr>
+        </a:solidFill>
+        <a:ln w="25400" cap="flat" cmpd="sng" algn="ctr">
+          <a:solidFill>
+            <a:schemeClr val="lt1">
+              <a:hueOff val="0"/>
+              <a:satOff val="0"/>
+              <a:lumOff val="0"/>
+              <a:alphaOff val="0"/>
+            </a:schemeClr>
+          </a:solidFill>
+          <a:prstDash val="solid"/>
+        </a:ln>
+        <a:effectLst/>
+      </dsp:spPr>
+      <dsp:style>
+        <a:lnRef idx="2">
+          <a:scrgbClr r="0" g="0" b="0"/>
+        </a:lnRef>
+        <a:fillRef idx="1">
+          <a:scrgbClr r="0" g="0" b="0"/>
+        </a:fillRef>
+        <a:effectRef idx="0">
+          <a:scrgbClr r="0" g="0" b="0"/>
+        </a:effectRef>
+        <a:fontRef idx="minor">
+          <a:schemeClr val="lt1"/>
+        </a:fontRef>
+      </dsp:style>
+      <dsp:txBody>
+        <a:bodyPr spcFirstLastPara="0" vert="horz" wrap="square" lIns="11430" tIns="11430" rIns="11430" bIns="11430" numCol="1" spcCol="1270" anchor="ctr" anchorCtr="0">
+          <a:noAutofit/>
+        </a:bodyPr>
+        <a:lstStyle/>
+        <a:p>
+          <a:pPr lvl="0" algn="ctr" defTabSz="800100">
+            <a:lnSpc>
+              <a:spcPct val="90000"/>
+            </a:lnSpc>
+            <a:spcBef>
+              <a:spcPct val="0"/>
+            </a:spcBef>
+            <a:spcAft>
+              <a:spcPct val="35000"/>
+            </a:spcAft>
+          </a:pPr>
+          <a:r>
+            <a:rPr lang="en-US" sz="1800" kern="1200" dirty="0" smtClean="0"/>
+            <a:t>Area 2</a:t>
+          </a:r>
+          <a:endParaRPr lang="en-US" sz="1800" kern="1200" dirty="0"/>
+        </a:p>
+      </dsp:txBody>
+      <dsp:txXfrm>
+        <a:off x="1623185" y="1643427"/>
+        <a:ext cx="1358940" cy="679470"/>
+      </dsp:txXfrm>
+    </dsp:sp>
+    <dsp:sp modelId="{136F3DE8-C371-46C3-B413-FB7BF5D816A0}">
+      <dsp:nvSpPr>
+        <dsp:cNvPr id="0" name=""/>
+        <dsp:cNvSpPr/>
+      </dsp:nvSpPr>
+      <dsp:spPr>
+        <a:xfrm>
+          <a:off x="3267503" y="1643427"/>
+          <a:ext cx="1358940" cy="679470"/>
+        </a:xfrm>
+        <a:prstGeom prst="rect">
+          <a:avLst/>
+        </a:prstGeom>
+        <a:solidFill>
+          <a:schemeClr val="accent1">
+            <a:hueOff val="0"/>
+            <a:satOff val="0"/>
+            <a:lumOff val="0"/>
+            <a:alphaOff val="0"/>
+          </a:schemeClr>
+        </a:solidFill>
+        <a:ln w="25400" cap="flat" cmpd="sng" algn="ctr">
+          <a:solidFill>
+            <a:schemeClr val="lt1">
+              <a:hueOff val="0"/>
+              <a:satOff val="0"/>
+              <a:lumOff val="0"/>
+              <a:alphaOff val="0"/>
+            </a:schemeClr>
+          </a:solidFill>
+          <a:prstDash val="solid"/>
+        </a:ln>
+        <a:effectLst/>
+      </dsp:spPr>
+      <dsp:style>
+        <a:lnRef idx="2">
+          <a:scrgbClr r="0" g="0" b="0"/>
+        </a:lnRef>
+        <a:fillRef idx="1">
+          <a:scrgbClr r="0" g="0" b="0"/>
+        </a:fillRef>
+        <a:effectRef idx="0">
+          <a:scrgbClr r="0" g="0" b="0"/>
+        </a:effectRef>
+        <a:fontRef idx="minor">
+          <a:schemeClr val="lt1"/>
+        </a:fontRef>
+      </dsp:style>
+      <dsp:txBody>
+        <a:bodyPr spcFirstLastPara="0" vert="horz" wrap="square" lIns="11430" tIns="11430" rIns="11430" bIns="11430" numCol="1" spcCol="1270" anchor="ctr" anchorCtr="0">
+          <a:noAutofit/>
+        </a:bodyPr>
+        <a:lstStyle/>
+        <a:p>
+          <a:pPr lvl="0" algn="ctr" defTabSz="800100">
+            <a:lnSpc>
+              <a:spcPct val="90000"/>
+            </a:lnSpc>
+            <a:spcBef>
+              <a:spcPct val="0"/>
+            </a:spcBef>
+            <a:spcAft>
+              <a:spcPct val="35000"/>
+            </a:spcAft>
+          </a:pPr>
+          <a:r>
+            <a:rPr lang="en-US" sz="1800" kern="1200" dirty="0" smtClean="0"/>
+            <a:t>Area 3</a:t>
+          </a:r>
+          <a:endParaRPr lang="en-US" sz="1800" kern="1200" dirty="0"/>
+        </a:p>
+      </dsp:txBody>
+      <dsp:txXfrm>
+        <a:off x="3267503" y="1643427"/>
+        <a:ext cx="1358940" cy="679470"/>
+      </dsp:txXfrm>
+    </dsp:sp>
   </dsp:spTree>
 </dsp:drawing>
 </file>
@@ -12948,8 +13913,13 @@
           <a:p>
             <a:r>
               <a:rPr lang="en-US" sz="2500" dirty="0" smtClean="0"/>
-              <a:t>Organized around ______________________________</a:t>
-            </a:r>
+              <a:t>Organized around </a:t>
+            </a:r>
+            <a:r>
+              <a:rPr lang="en-US" sz="2500" b="1" u="sng" dirty="0" smtClean="0"/>
+              <a:t>products, projects, or markets</a:t>
+            </a:r>
+            <a:endParaRPr lang="en-US" sz="2500" b="1" u="sng" dirty="0" smtClean="0"/>
           </a:p>
           <a:p>
             <a:r>
@@ -19038,16 +20008,24 @@
           <a:p>
             <a:pPr lvl="1"/>
             <a:r>
+              <a:rPr lang="en-US" b="1" u="sng" dirty="0" smtClean="0"/>
+              <a:t>Tall</a:t>
+            </a:r>
+            <a:r>
               <a:rPr lang="en-US" dirty="0" smtClean="0"/>
-              <a:t>______ </a:t>
+              <a:t> </a:t>
             </a:r>
             <a:r>
               <a:rPr lang="en-US" dirty="0"/>
               <a:t>structure vs. </a:t>
             </a:r>
             <a:r>
+              <a:rPr lang="en-US" b="1" u="sng" dirty="0" smtClean="0"/>
+              <a:t>Flat</a:t>
+            </a:r>
+            <a:r>
               <a:rPr lang="en-US" dirty="0" smtClean="0"/>
-              <a:t>______ </a:t>
+              <a:t> </a:t>
             </a:r>
             <a:r>
               <a:rPr lang="en-US" dirty="0"/>
@@ -19074,16 +20052,24 @@
           <a:p>
             <a:pPr lvl="1"/>
             <a:r>
+              <a:rPr lang="en-US" b="1" u="sng" dirty="0" smtClean="0"/>
+              <a:t>Centralization</a:t>
+            </a:r>
+            <a:r>
               <a:rPr lang="en-US" dirty="0" smtClean="0"/>
-              <a:t>____________ </a:t>
+              <a:t> </a:t>
             </a:r>
             <a:r>
               <a:rPr lang="en-US" dirty="0"/>
               <a:t>vs. </a:t>
             </a:r>
             <a:r>
+              <a:rPr lang="en-US" b="1" u="sng" dirty="0" smtClean="0"/>
+              <a:t>Decentralization</a:t>
+            </a:r>
+            <a:r>
               <a:rPr lang="en-US" dirty="0" smtClean="0"/>
-              <a:t>______________ </a:t>
+              <a:t> </a:t>
             </a:r>
             <a:r>
               <a:rPr lang="en-US" sz="2000" dirty="0" smtClean="0"/>

</xml_diff>